<commit_message>
Conflicto en archivo... creo
</commit_message>
<xml_diff>
--- a/Exposiciones/Puntos por historia de usuarioHVG.pptx
+++ b/Exposiciones/Puntos por historia de usuarioHVG.pptx
@@ -112,7 +112,7 @@
   </p:defaultTextStyle>
   <p:extLst>
     <p:ext uri="{EFAFB233-063F-42B5-8137-9DF3F51BA10A}">
-      <p15:sldGuideLst xmlns="" xmlns:p15="http://schemas.microsoft.com/office/powerpoint/2012/main"/>
+      <p15:sldGuideLst xmlns:p15="http://schemas.microsoft.com/office/powerpoint/2012/main" xmlns=""/>
     </p:ext>
   </p:extLst>
 </p:presentation>
@@ -1930,7 +1930,7 @@
           <a:p>
             <a:fld id="{EC2A29EB-B1E9-45F6-B8D4-76E91716F2C0}" type="datetimeFigureOut">
               <a:rPr lang="es-MX" smtClean="0"/>
-              <a:t>05/03/2015</a:t>
+              <a:t>06/03/2015</a:t>
             </a:fld>
             <a:endParaRPr lang="es-MX"/>
           </a:p>
@@ -2111,7 +2111,7 @@
           <a:p>
             <a:fld id="{EC2A29EB-B1E9-45F6-B8D4-76E91716F2C0}" type="datetimeFigureOut">
               <a:rPr lang="es-MX" smtClean="0"/>
-              <a:t>05/03/2015</a:t>
+              <a:t>06/03/2015</a:t>
             </a:fld>
             <a:endParaRPr lang="es-MX"/>
           </a:p>
@@ -2262,7 +2262,7 @@
           <a:p>
             <a:fld id="{EC2A29EB-B1E9-45F6-B8D4-76E91716F2C0}" type="datetimeFigureOut">
               <a:rPr lang="es-MX" smtClean="0"/>
-              <a:t>05/03/2015</a:t>
+              <a:t>06/03/2015</a:t>
             </a:fld>
             <a:endParaRPr lang="es-MX"/>
           </a:p>
@@ -4088,7 +4088,7 @@
           <a:p>
             <a:fld id="{EC2A29EB-B1E9-45F6-B8D4-76E91716F2C0}" type="datetimeFigureOut">
               <a:rPr lang="es-MX" smtClean="0"/>
-              <a:t>05/03/2015</a:t>
+              <a:t>06/03/2015</a:t>
             </a:fld>
             <a:endParaRPr lang="es-MX"/>
           </a:p>
@@ -5958,7 +5958,7 @@
           <a:p>
             <a:fld id="{EC2A29EB-B1E9-45F6-B8D4-76E91716F2C0}" type="datetimeFigureOut">
               <a:rPr lang="es-MX" smtClean="0"/>
-              <a:t>05/03/2015</a:t>
+              <a:t>06/03/2015</a:t>
             </a:fld>
             <a:endParaRPr lang="es-MX"/>
           </a:p>
@@ -6071,7 +6071,7 @@
           <a:p>
             <a:fld id="{EC2A29EB-B1E9-45F6-B8D4-76E91716F2C0}" type="datetimeFigureOut">
               <a:rPr lang="es-MX" smtClean="0"/>
-              <a:t>05/03/2015</a:t>
+              <a:t>06/03/2015</a:t>
             </a:fld>
             <a:endParaRPr lang="es-MX"/>
           </a:p>
@@ -6612,7 +6612,7 @@
           <a:p>
             <a:fld id="{EC2A29EB-B1E9-45F6-B8D4-76E91716F2C0}" type="datetimeFigureOut">
               <a:rPr lang="es-MX" smtClean="0"/>
-              <a:t>05/03/2015</a:t>
+              <a:t>06/03/2015</a:t>
             </a:fld>
             <a:endParaRPr lang="es-MX"/>
           </a:p>
@@ -6725,7 +6725,7 @@
           <a:p>
             <a:fld id="{EC2A29EB-B1E9-45F6-B8D4-76E91716F2C0}" type="datetimeFigureOut">
               <a:rPr lang="es-MX" smtClean="0"/>
-              <a:t>05/03/2015</a:t>
+              <a:t>06/03/2015</a:t>
             </a:fld>
             <a:endParaRPr lang="es-MX"/>
           </a:p>
@@ -8436,7 +8436,7 @@
           <a:p>
             <a:fld id="{EC2A29EB-B1E9-45F6-B8D4-76E91716F2C0}" type="datetimeFigureOut">
               <a:rPr lang="es-MX" smtClean="0"/>
-              <a:t>05/03/2015</a:t>
+              <a:t>06/03/2015</a:t>
             </a:fld>
             <a:endParaRPr lang="es-MX"/>
           </a:p>
@@ -8587,7 +8587,7 @@
           <a:p>
             <a:fld id="{EC2A29EB-B1E9-45F6-B8D4-76E91716F2C0}" type="datetimeFigureOut">
               <a:rPr lang="es-MX" smtClean="0"/>
-              <a:t>05/03/2015</a:t>
+              <a:t>06/03/2015</a:t>
             </a:fld>
             <a:endParaRPr lang="es-MX"/>
           </a:p>
@@ -12202,7 +12202,7 @@
           <a:p>
             <a:fld id="{EC2A29EB-B1E9-45F6-B8D4-76E91716F2C0}" type="datetimeFigureOut">
               <a:rPr lang="es-MX" smtClean="0"/>
-              <a:t>05/03/2015</a:t>
+              <a:t>06/03/2015</a:t>
             </a:fld>
             <a:endParaRPr lang="es-MX"/>
           </a:p>
@@ -14061,7 +14061,7 @@
           <a:p>
             <a:fld id="{EC2A29EB-B1E9-45F6-B8D4-76E91716F2C0}" type="datetimeFigureOut">
               <a:rPr lang="es-MX" smtClean="0"/>
-              <a:t>05/03/2015</a:t>
+              <a:t>06/03/2015</a:t>
             </a:fld>
             <a:endParaRPr lang="es-MX"/>
           </a:p>

</xml_diff>